<commit_message>
added changes after meeting with OGA related to prod issues
</commit_message>
<xml_diff>
--- a/Requirements/Presentations/GreenSheets OGA presentation_version 1.pptx
+++ b/Requirements/Presentations/GreenSheets OGA presentation_version 1.pptx
@@ -356,7 +356,7 @@
               <a:pPr>
                 <a:defRPr/>
               </a:pPr>
-              <a:t>6/10/2016</a:t>
+              <a:t>6/13/2016</a:t>
             </a:fld>
             <a:endParaRPr lang="en-US" dirty="0"/>
           </a:p>
@@ -1540,7 +1540,7 @@
               <a:pPr>
                 <a:defRPr/>
               </a:pPr>
-              <a:t>June 10, 2016</a:t>
+              <a:t>June 13, 2016</a:t>
             </a:fld>
             <a:endParaRPr lang="en-US" dirty="0"/>
           </a:p>
@@ -4122,7 +4122,7 @@
           <a:p>
             <a:fld id="{9E23832F-A033-A54E-AB4C-FBC3D83AD4AA}" type="datetimeFigureOut">
               <a:rPr lang="en-US" smtClean="0"/>
-              <a:t>6/10/2016</a:t>
+              <a:t>6/13/2016</a:t>
             </a:fld>
             <a:endParaRPr lang="en-US"/>
           </a:p>
@@ -4292,7 +4292,7 @@
           <a:p>
             <a:fld id="{9E23832F-A033-A54E-AB4C-FBC3D83AD4AA}" type="datetimeFigureOut">
               <a:rPr lang="en-US" smtClean="0"/>
-              <a:t>6/10/2016</a:t>
+              <a:t>6/13/2016</a:t>
             </a:fld>
             <a:endParaRPr lang="en-US"/>
           </a:p>
@@ -8265,7 +8265,7 @@
               </a14:hiddenLine>
             </a:ext>
             <a:ext uri="{FAA26D3D-D897-4be2-8F04-BA451C77F1D7}">
-              <ma14:placeholderFlag xmlns="" xmlns:ma14="http://schemas.microsoft.com/office/mac/drawingml/2011/main" val="1"/>
+              <ma14:placeholderFlag xmlns:ma14="http://schemas.microsoft.com/office/mac/drawingml/2011/main" xmlns="" val="1"/>
             </a:ext>
           </a:extLst>
         </p:spPr>
@@ -8328,7 +8328,7 @@
               </a14:hiddenLine>
             </a:ext>
             <a:ext uri="{FAA26D3D-D897-4be2-8F04-BA451C77F1D7}">
-              <ma14:placeholderFlag xmlns="" xmlns:ma14="http://schemas.microsoft.com/office/mac/drawingml/2011/main" val="1"/>
+              <ma14:placeholderFlag xmlns:ma14="http://schemas.microsoft.com/office/mac/drawingml/2011/main" xmlns="" val="1"/>
             </a:ext>
           </a:extLst>
         </p:spPr>
@@ -8422,7 +8422,7 @@
             </a:pPr>
             <a:fld id="{63A80243-55C2-1C49-BA61-21AC8F55AA45}" type="datetime4">
               <a:rPr lang="en-US" smtClean="0"/>
-              <a:t>June 10, 2016</a:t>
+              <a:t>June 13, 2016</a:t>
             </a:fld>
             <a:endParaRPr lang="en-US" dirty="0"/>
           </a:p>
@@ -9087,7 +9087,7 @@
                   </a:outerShdw>
                 </a:effectLst>
               </a:rPr>
-              <a:t>DD-MM-2016</a:t>
+              <a:t>28-June-2016</a:t>
             </a:r>
             <a:r>
               <a:rPr lang="en-US" altLang="en-US" dirty="0">
@@ -9276,9 +9276,13 @@
               <a:t>Matter Expert: </a:t>
             </a:r>
             <a:r>
-              <a:rPr lang="en-US" sz="1050" dirty="0"/>
-              <a:t>TBD</a:t>
-            </a:r>
+              <a:rPr lang="en-US" sz="1050" dirty="0" smtClean="0"/>
+              <a:t>Eugenia Chester</a:t>
+            </a:r>
+          </a:p>
+          <a:p>
+            <a:pPr lvl="1"/>
+            <a:endParaRPr lang="en-US" sz="1050" dirty="0"/>
           </a:p>
           <a:p>
             <a:pPr marL="228600" lvl="2"/>
@@ -9327,28 +9331,12 @@
           <a:p>
             <a:pPr lvl="1"/>
             <a:r>
-              <a:rPr lang="en-US" sz="1050" dirty="0" smtClean="0">
-                <a:solidFill>
-                  <a:srgbClr val="0070C0"/>
-                </a:solidFill>
-              </a:rPr>
-              <a:t>Dinesh Reddy</a:t>
-            </a:r>
-            <a:r>
-              <a:rPr lang="en-US" sz="1050" i="1" dirty="0" smtClean="0"/>
-              <a:t>, </a:t>
-            </a:r>
-            <a:r>
-              <a:rPr lang="en-US" sz="1050" i="1" dirty="0"/>
-              <a:t>Technical Project Manager</a:t>
-            </a:r>
-            <a:endParaRPr lang="en-US" sz="1050" i="1" dirty="0" smtClean="0"/>
-          </a:p>
-          <a:p>
-            <a:pPr lvl="1"/>
-            <a:r>
               <a:rPr lang="en-US" sz="1050" dirty="0" smtClean="0"/>
-              <a:t>Gerald Momplaisir, </a:t>
+              <a:t>Gerald </a:t>
+            </a:r>
+            <a:r>
+              <a:rPr lang="en-US" sz="1050" dirty="0" smtClean="0"/>
+              <a:t>Momplaisir, </a:t>
             </a:r>
             <a:r>
               <a:rPr lang="en-US" sz="1050" i="1" dirty="0" smtClean="0"/>
@@ -9391,32 +9379,12 @@
           <a:p>
             <a:pPr lvl="1"/>
             <a:r>
-              <a:rPr lang="en-US" sz="1050" dirty="0" smtClean="0">
-                <a:solidFill>
-                  <a:srgbClr val="0070C0"/>
-                </a:solidFill>
-              </a:rPr>
-              <a:t>Iris Hunt</a:t>
-            </a:r>
-            <a:r>
-              <a:rPr lang="en-US" sz="1050" i="1" dirty="0">
-                <a:solidFill>
-                  <a:srgbClr val="0070C0"/>
-                </a:solidFill>
-              </a:rPr>
-              <a:t>, Requirements </a:t>
-            </a:r>
-            <a:r>
-              <a:rPr lang="en-US" sz="1050" i="1" dirty="0"/>
-              <a:t>Analyst</a:t>
-            </a:r>
-            <a:endParaRPr lang="en-US" sz="1050" i="1" dirty="0" smtClean="0"/>
-          </a:p>
-          <a:p>
-            <a:pPr lvl="1"/>
-            <a:r>
               <a:rPr lang="en-US" sz="1050" dirty="0" smtClean="0"/>
-              <a:t>David Chang, </a:t>
+              <a:t>David </a:t>
+            </a:r>
+            <a:r>
+              <a:rPr lang="en-US" sz="1050" dirty="0" smtClean="0"/>
+              <a:t>Chang, </a:t>
             </a:r>
             <a:r>
               <a:rPr lang="en-US" sz="1050" i="1" dirty="0" smtClean="0"/>
@@ -9424,31 +9392,9 @@
             </a:r>
           </a:p>
           <a:p>
-            <a:pPr lvl="1"/>
-            <a:r>
-              <a:rPr lang="en-US" sz="1050" dirty="0" smtClean="0">
-                <a:solidFill>
-                  <a:srgbClr val="0070C0"/>
-                </a:solidFill>
-              </a:rPr>
-              <a:t>Sheng Zhao</a:t>
-            </a:r>
-            <a:r>
-              <a:rPr lang="en-US" sz="1050" i="1" dirty="0" smtClean="0">
-                <a:solidFill>
-                  <a:srgbClr val="0070C0"/>
-                </a:solidFill>
-              </a:rPr>
-              <a:t>, </a:t>
-            </a:r>
-            <a:r>
-              <a:rPr lang="en-US" sz="1050" i="1" dirty="0"/>
-              <a:t>Database Developer</a:t>
-            </a:r>
-            <a:endParaRPr lang="en-US" sz="1050" i="1" dirty="0" smtClean="0"/>
-          </a:p>
-          <a:p>
-            <a:pPr lvl="1"/>
+            <a:pPr marL="228600" lvl="1" indent="0">
+              <a:buNone/>
+            </a:pPr>
             <a:endParaRPr lang="en-US" sz="1200" dirty="0" smtClean="0"/>
           </a:p>
         </p:txBody>
@@ -9875,8 +9821,8 @@
         </p:nvSpPr>
         <p:spPr>
           <a:xfrm>
-            <a:off x="493776" y="304800"/>
-            <a:ext cx="8165592" cy="457200"/>
+            <a:off x="493776" y="228600"/>
+            <a:ext cx="8165592" cy="381000"/>
           </a:xfrm>
         </p:spPr>
         <p:txBody>
@@ -9934,8 +9880,8 @@
         </p:nvSpPr>
         <p:spPr>
           <a:xfrm>
-            <a:off x="493776" y="838200"/>
-            <a:ext cx="8165592" cy="5715000"/>
+            <a:off x="493776" y="609600"/>
+            <a:ext cx="8345424" cy="6096000"/>
           </a:xfrm>
         </p:spPr>
         <p:txBody>
@@ -9950,59 +9896,63 @@
           <a:p>
             <a:pPr lvl="2"/>
             <a:r>
-              <a:rPr lang="en-US" sz="1400" dirty="0" err="1"/>
+              <a:rPr lang="en-US" sz="1200" dirty="0" err="1"/>
               <a:t>Greensheets</a:t>
             </a:r>
             <a:r>
-              <a:rPr lang="en-US" sz="1400" dirty="0"/>
+              <a:rPr lang="en-US" sz="1200" dirty="0"/>
               <a:t> Submission (Major reoccurring issue (PD </a:t>
             </a:r>
             <a:r>
-              <a:rPr lang="en-US" sz="1400" dirty="0" err="1"/>
+              <a:rPr lang="en-US" sz="1200" dirty="0" err="1"/>
               <a:t>Greensheet</a:t>
             </a:r>
             <a:r>
-              <a:rPr lang="en-US" sz="1400" dirty="0"/>
+              <a:rPr lang="en-US" sz="1200" dirty="0"/>
               <a:t>)</a:t>
             </a:r>
           </a:p>
           <a:p>
             <a:pPr lvl="2"/>
             <a:r>
-              <a:rPr lang="en-US" sz="1400" dirty="0" err="1"/>
+              <a:rPr lang="en-US" sz="1200" dirty="0" err="1"/>
               <a:t>Greensheets</a:t>
             </a:r>
             <a:r>
-              <a:rPr lang="en-US" sz="1400" dirty="0"/>
+              <a:rPr lang="en-US" sz="1200" dirty="0"/>
               <a:t> Timeout (Major reoccurring issue)</a:t>
             </a:r>
           </a:p>
           <a:p>
             <a:pPr lvl="2"/>
             <a:r>
-              <a:rPr lang="en-US" sz="1400" dirty="0"/>
+              <a:rPr lang="en-US" sz="1200" dirty="0"/>
               <a:t>Duplicate </a:t>
             </a:r>
             <a:r>
-              <a:rPr lang="en-US" sz="1400" dirty="0" err="1"/>
+              <a:rPr lang="en-US" sz="1200" dirty="0" err="1"/>
               <a:t>greensheets</a:t>
             </a:r>
             <a:r>
-              <a:rPr lang="en-US" sz="1400" dirty="0"/>
+              <a:rPr lang="en-US" sz="1200" dirty="0"/>
               <a:t> (only reoccurring occasionally</a:t>
             </a:r>
             <a:r>
-              <a:rPr lang="en-US" sz="1400" dirty="0" smtClean="0"/>
+              <a:rPr lang="en-US" sz="1200" dirty="0" smtClean="0"/>
               <a:t>)</a:t>
             </a:r>
           </a:p>
           <a:p>
             <a:pPr lvl="2"/>
             <a:r>
-              <a:rPr lang="en-US" sz="1400" dirty="0" smtClean="0"/>
-              <a:t>Attachments issue (new)</a:t>
-            </a:r>
-            <a:endParaRPr lang="en-US" sz="1400" dirty="0"/>
+              <a:rPr lang="en-US" sz="1200" dirty="0" smtClean="0"/>
+              <a:t>Attachments issue (</a:t>
+            </a:r>
+            <a:r>
+              <a:rPr lang="en-US" sz="1200" dirty="0" smtClean="0"/>
+              <a:t>new)</a:t>
+            </a:r>
+            <a:endParaRPr lang="en-US" sz="1200" dirty="0"/>
           </a:p>
           <a:p>
             <a:r>
@@ -10073,23 +10023,23 @@
               <a:defRPr/>
             </a:pPr>
             <a:r>
-              <a:rPr lang="en-US" sz="1400" dirty="0"/>
+              <a:rPr lang="en-US" sz="1200" dirty="0"/>
               <a:t>User-friendly dashboard report to easily access the grants and the underlying </a:t>
             </a:r>
             <a:r>
-              <a:rPr lang="en-US" sz="1400" dirty="0" err="1"/>
+              <a:rPr lang="en-US" sz="1200" dirty="0" err="1"/>
               <a:t>greensheets</a:t>
             </a:r>
             <a:r>
-              <a:rPr lang="en-US" sz="1400" dirty="0"/>
+              <a:rPr lang="en-US" sz="1200" dirty="0"/>
               <a:t> and also to help visualize some of the key metrics. This is house-keeping” reports, for example ‘how many </a:t>
             </a:r>
             <a:r>
-              <a:rPr lang="en-US" sz="1400" dirty="0" err="1"/>
+              <a:rPr lang="en-US" sz="1200" dirty="0" err="1"/>
               <a:t>greensheets</a:t>
             </a:r>
             <a:r>
-              <a:rPr lang="en-US" sz="1400" dirty="0"/>
+              <a:rPr lang="en-US" sz="1200" dirty="0"/>
               <a:t> in Submitted status</a:t>
             </a:r>
           </a:p>
@@ -10138,8 +10088,33 @@
             </a:pPr>
             <a:r>
               <a:rPr lang="en-US" dirty="0"/>
-              <a:t>UI modernization and usability</a:t>
-            </a:r>
+              <a:t>UI modernization and </a:t>
+            </a:r>
+            <a:r>
+              <a:rPr lang="en-US" dirty="0" smtClean="0"/>
+              <a:t>usability (</a:t>
+            </a:r>
+            <a:r>
+              <a:rPr lang="en-US" sz="1200" dirty="0"/>
+              <a:t>e.g. </a:t>
+            </a:r>
+            <a:r>
+              <a:rPr lang="en-US" sz="1200" dirty="0"/>
+              <a:t>add a link to policy for each or some </a:t>
+            </a:r>
+            <a:r>
+              <a:rPr lang="en-US" sz="1200" dirty="0"/>
+              <a:t>questions</a:t>
+            </a:r>
+            <a:r>
+              <a:rPr lang="en-US" dirty="0" smtClean="0">
+                <a:solidFill>
+                  <a:schemeClr val="dk1"/>
+                </a:solidFill>
+              </a:rPr>
+              <a:t>)</a:t>
+            </a:r>
+            <a:endParaRPr lang="en-US" dirty="0" smtClean="0"/>
           </a:p>
           <a:p>
             <a:pPr marL="400050" lvl="4" indent="-171450" fontAlgn="auto">
@@ -10152,7 +10127,7 @@
               <a:buClrTx/>
               <a:defRPr/>
             </a:pPr>
-            <a:endParaRPr lang="en-US" dirty="0"/>
+            <a:endParaRPr lang="en-US" dirty="0" smtClean="0"/>
           </a:p>
           <a:p>
             <a:pPr marL="228600" lvl="4" indent="0" fontAlgn="auto">
@@ -10167,7 +10142,7 @@
               <a:defRPr/>
             </a:pPr>
             <a:r>
-              <a:rPr lang="en-US" u="sng" dirty="0">
+              <a:rPr lang="en-US" u="sng" dirty="0" smtClean="0">
                 <a:solidFill>
                   <a:srgbClr val="0070C0"/>
                 </a:solidFill>
@@ -10201,8 +10176,53 @@
             </a:pPr>
             <a:r>
               <a:rPr lang="en-US" dirty="0"/>
-              <a:t>Using additional capabilities of Form Builder</a:t>
-            </a:r>
+              <a:t>Address needs with revised awards and supplements</a:t>
+            </a:r>
+          </a:p>
+          <a:p>
+            <a:pPr marL="400050" lvl="4" indent="-171450" fontAlgn="auto">
+              <a:spcBef>
+                <a:spcPts val="0"/>
+              </a:spcBef>
+              <a:spcAft>
+                <a:spcPts val="0"/>
+              </a:spcAft>
+              <a:buClrTx/>
+              <a:defRPr/>
+            </a:pPr>
+            <a:r>
+              <a:rPr lang="en-US" dirty="0" smtClean="0"/>
+              <a:t>Form Builder integration</a:t>
+            </a:r>
+            <a:r>
+              <a:rPr lang="en-US" dirty="0" smtClean="0"/>
+              <a:t> </a:t>
+            </a:r>
+            <a:r>
+              <a:rPr lang="en-US" dirty="0"/>
+              <a:t>changes </a:t>
+            </a:r>
+            <a:r>
+              <a:rPr lang="en-US" dirty="0" smtClean="0"/>
+              <a:t>(</a:t>
+            </a:r>
+            <a:r>
+              <a:rPr lang="en-US" sz="1200" dirty="0" smtClean="0"/>
+              <a:t>e.g. breaking up modules into smaller parts and deploying separately, using </a:t>
+            </a:r>
+            <a:r>
+              <a:rPr lang="en-US" sz="1200" dirty="0"/>
+              <a:t>additional capabilities </a:t>
+            </a:r>
+            <a:r>
+              <a:rPr lang="en-US" sz="1200" dirty="0" smtClean="0"/>
+              <a:t>of FB</a:t>
+            </a:r>
+            <a:r>
+              <a:rPr lang="en-US" dirty="0" smtClean="0"/>
+              <a:t>)</a:t>
+            </a:r>
+            <a:endParaRPr lang="en-US" dirty="0"/>
           </a:p>
           <a:p>
             <a:pPr marL="400050" lvl="4" indent="-171450" fontAlgn="auto">
@@ -10328,14 +10348,14 @@
           <p:nvPr>
             <p:extLst>
               <p:ext uri="{D42A27DB-BD31-4B8C-83A1-F6EECF244321}">
-                <p14:modId xmlns:p14="http://schemas.microsoft.com/office/powerpoint/2010/main" val="3063052403"/>
+                <p14:modId xmlns:p14="http://schemas.microsoft.com/office/powerpoint/2010/main" val="3027884175"/>
               </p:ext>
             </p:extLst>
           </p:nvPr>
         </p:nvGraphicFramePr>
         <p:xfrm>
           <a:off x="762000" y="990601"/>
-          <a:ext cx="7772400" cy="5397066"/>
+          <a:ext cx="7772400" cy="5137985"/>
         </p:xfrm>
         <a:graphic>
           <a:graphicData uri="http://schemas.openxmlformats.org/drawingml/2006/table">
@@ -10344,14 +10364,14 @@
                 <a:tableStyleId>{00A15C55-8517-42AA-B614-E9B94910E393}</a:tableStyleId>
               </a:tblPr>
               <a:tblGrid>
-                <a:gridCol w="2819400">
+                <a:gridCol w="2590800">
                   <a:extLst>
                     <a:ext uri="{9D8B030D-6E8A-4147-A177-3AD203B41FA5}">
                       <a16:colId xmlns:a16="http://schemas.microsoft.com/office/drawing/2014/main" val="3221469317"/>
                     </a:ext>
                   </a:extLst>
                 </a:gridCol>
-                <a:gridCol w="3352800">
+                <a:gridCol w="3581400">
                   <a:extLst>
                     <a:ext uri="{9D8B030D-6E8A-4147-A177-3AD203B41FA5}">
                       <a16:colId xmlns:a16="http://schemas.microsoft.com/office/drawing/2014/main" val="16879550"/>
@@ -10419,17 +10439,17 @@
                   </a:ext>
                 </a:extLst>
               </a:tr>
-              <a:tr h="1339013">
+              <a:tr h="1034213">
                 <a:tc>
                   <a:txBody>
                     <a:bodyPr/>
                     <a:lstStyle/>
                     <a:p>
                       <a:r>
-                        <a:rPr lang="en-US" sz="1600" dirty="0" smtClean="0"/>
+                        <a:rPr lang="en-US" sz="1200" dirty="0" smtClean="0"/>
                         <a:t>Non-UI reporting</a:t>
                       </a:r>
-                      <a:endParaRPr lang="en-US" sz="1600" dirty="0"/>
+                      <a:endParaRPr lang="en-US" sz="1200" dirty="0"/>
                     </a:p>
                   </a:txBody>
                   <a:tcPr/>
@@ -10440,10 +10460,10 @@
                     <a:lstStyle/>
                     <a:p>
                       <a:r>
-                        <a:rPr lang="en-US" sz="1600" dirty="0" smtClean="0"/>
+                        <a:rPr lang="en-US" sz="1200" dirty="0" smtClean="0"/>
                         <a:t>A new approach to extracting questions from Form Builder and saving them in different tables. This approach will prepare the database to handle reporting requirements with ease.</a:t>
                       </a:r>
-                      <a:endParaRPr lang="en-US" sz="1600" dirty="0"/>
+                      <a:endParaRPr lang="en-US" sz="1200" dirty="0"/>
                     </a:p>
                   </a:txBody>
                   <a:tcPr/>
@@ -10454,10 +10474,10 @@
                     <a:lstStyle/>
                     <a:p>
                       <a:r>
-                        <a:rPr lang="en-US" sz="1600" dirty="0" smtClean="0"/>
+                        <a:rPr lang="en-US" sz="1200" dirty="0" smtClean="0"/>
                         <a:t>From now to beginning of 2016 FY</a:t>
                       </a:r>
-                      <a:endParaRPr lang="en-US" sz="1600" dirty="0"/>
+                      <a:endParaRPr lang="en-US" sz="1200" dirty="0"/>
                     </a:p>
                   </a:txBody>
                   <a:tcPr/>
@@ -10492,12 +10512,12 @@
                         <a:defRPr/>
                       </a:pPr>
                       <a:r>
-                        <a:rPr lang="en-US" sz="1600" dirty="0" smtClean="0"/>
+                        <a:rPr lang="en-US" sz="1200" dirty="0" smtClean="0"/>
                         <a:t>Upgrade technology stack</a:t>
                       </a:r>
                     </a:p>
                     <a:p>
-                      <a:endParaRPr lang="en-US" sz="1600" dirty="0"/>
+                      <a:endParaRPr lang="en-US" sz="1200" dirty="0"/>
                     </a:p>
                   </a:txBody>
                   <a:tcPr/>
@@ -10508,10 +10528,10 @@
                     <a:lstStyle/>
                     <a:p>
                       <a:r>
-                        <a:rPr lang="en-US" sz="1600" dirty="0" smtClean="0"/>
+                        <a:rPr lang="en-US" sz="1200" dirty="0" smtClean="0"/>
                         <a:t>Will enhance security</a:t>
                       </a:r>
-                      <a:endParaRPr lang="en-US" sz="1600" dirty="0"/>
+                      <a:endParaRPr lang="en-US" sz="1200" dirty="0"/>
                     </a:p>
                   </a:txBody>
                   <a:tcPr/>
@@ -10522,10 +10542,10 @@
                     <a:lstStyle/>
                     <a:p>
                       <a:r>
-                        <a:rPr lang="en-US" sz="1600" dirty="0" smtClean="0"/>
+                        <a:rPr lang="en-US" sz="1200" dirty="0" smtClean="0"/>
                         <a:t>From mid-September until mid-March</a:t>
                       </a:r>
-                      <a:endParaRPr lang="en-US" sz="1600" dirty="0"/>
+                      <a:endParaRPr lang="en-US" sz="1200" dirty="0"/>
                     </a:p>
                   </a:txBody>
                   <a:tcPr/>
@@ -10536,7 +10556,7 @@
                   </a:ext>
                 </a:extLst>
               </a:tr>
-              <a:tr h="642186">
+              <a:tr h="1417320">
                 <a:tc>
                   <a:txBody>
                     <a:bodyPr/>
@@ -10560,14 +10580,14 @@
                         <a:defRPr/>
                       </a:pPr>
                       <a:r>
-                        <a:rPr lang="en-US" sz="1600" dirty="0" smtClean="0"/>
+                        <a:rPr lang="en-US" sz="1200" dirty="0" smtClean="0"/>
                         <a:t>UI modernization and usability, enhancing search capabilities, addressing production issues related to UI and</a:t>
                       </a:r>
                       <a:r>
-                        <a:rPr lang="en-US" sz="1600" baseline="0" dirty="0" smtClean="0"/>
+                        <a:rPr lang="en-US" sz="1200" baseline="0" dirty="0" smtClean="0"/>
                         <a:t> technology upgrade</a:t>
                       </a:r>
-                      <a:endParaRPr lang="en-US" sz="1600" dirty="0" smtClean="0"/>
+                      <a:endParaRPr lang="en-US" sz="1200" dirty="0" smtClean="0"/>
                     </a:p>
                     <a:p>
                       <a:pPr marL="0" lvl="3" indent="-228600" algn="l" fontAlgn="auto">
@@ -10580,7 +10600,7 @@
                         <a:buClrTx/>
                         <a:defRPr/>
                       </a:pPr>
-                      <a:endParaRPr lang="en-US" sz="1600" dirty="0"/>
+                      <a:endParaRPr lang="en-US" sz="1200" dirty="0"/>
                     </a:p>
                   </a:txBody>
                   <a:tcPr/>
@@ -10591,7 +10611,7 @@
                     <a:lstStyle/>
                     <a:p>
                       <a:r>
-                        <a:rPr lang="en-US" sz="1600" kern="1200" dirty="0" smtClean="0">
+                        <a:rPr lang="en-US" sz="1200" kern="1200" dirty="0" smtClean="0">
                           <a:solidFill>
                             <a:schemeClr val="dk1"/>
                           </a:solidFill>
@@ -10599,10 +10619,29 @@
                           <a:ea typeface="+mn-ea"/>
                           <a:cs typeface="+mn-cs"/>
                         </a:rPr>
-                        <a:t>Requirements will be collected as soon as possible; implementation depends on completion of prior </a:t>
+                        <a:t>Requirements will be collected as soon as possible; implementation depends on completion of prior phases. </a:t>
                       </a:r>
+                    </a:p>
+                    <a:p>
+                      <a:pPr marL="0" marR="0" lvl="4" indent="0" algn="l" defTabSz="457200" rtl="0" eaLnBrk="1" fontAlgn="auto" latinLnBrk="0" hangingPunct="1">
+                        <a:lnSpc>
+                          <a:spcPct val="100000"/>
+                        </a:lnSpc>
+                        <a:spcBef>
+                          <a:spcPts val="0"/>
+                        </a:spcBef>
+                        <a:spcAft>
+                          <a:spcPts val="0"/>
+                        </a:spcAft>
+                        <a:buClrTx/>
+                        <a:buSzTx/>
+                        <a:buFontTx/>
+                        <a:buNone/>
+                        <a:tabLst/>
+                        <a:defRPr/>
+                      </a:pPr>
                       <a:r>
-                        <a:rPr lang="en-US" sz="1600" kern="1200" dirty="0" smtClean="0">
+                        <a:rPr lang="en-US" sz="1200" kern="1200" dirty="0" smtClean="0">
                           <a:solidFill>
                             <a:schemeClr val="dk1"/>
                           </a:solidFill>
@@ -10610,12 +10649,10 @@
                           <a:ea typeface="+mn-ea"/>
                           <a:cs typeface="+mn-cs"/>
                         </a:rPr>
-                        <a:t>phases. </a:t>
+                        <a:t>Examples: address needs with revised awards and supplements; add </a:t>
                       </a:r>
-                    </a:p>
-                    <a:p>
                       <a:r>
-                        <a:rPr lang="en-US" sz="1600" kern="1200" dirty="0" smtClean="0">
+                        <a:rPr lang="en-US" sz="1200" kern="1200" dirty="0" smtClean="0">
                           <a:solidFill>
                             <a:schemeClr val="dk1"/>
                           </a:solidFill>
@@ -10623,9 +10660,9 @@
                           <a:ea typeface="+mn-ea"/>
                           <a:cs typeface="+mn-cs"/>
                         </a:rPr>
-                        <a:t>Usability example – add a link to policy for each or some questions.</a:t>
+                        <a:t>a link to policy for each or some questions.</a:t>
                       </a:r>
-                      <a:endParaRPr lang="en-US" sz="1600" kern="1200" dirty="0">
+                      <a:endParaRPr lang="en-US" sz="1200" kern="1200" dirty="0">
                         <a:solidFill>
                           <a:schemeClr val="dk1"/>
                         </a:solidFill>
@@ -10643,7 +10680,7 @@
                     <a:lstStyle/>
                     <a:p>
                       <a:r>
-                        <a:rPr lang="en-US" sz="1600" kern="1200" dirty="0" smtClean="0">
+                        <a:rPr lang="en-US" sz="1200" kern="1200" dirty="0" smtClean="0">
                           <a:solidFill>
                             <a:schemeClr val="dk1"/>
                           </a:solidFill>
@@ -10653,7 +10690,7 @@
                         </a:rPr>
                         <a:t>From mid-July 2016 until end of the project</a:t>
                       </a:r>
-                      <a:endParaRPr lang="en-US" sz="1600" kern="1200" dirty="0">
+                      <a:endParaRPr lang="en-US" sz="1200" kern="1200" dirty="0">
                         <a:solidFill>
                           <a:schemeClr val="dk1"/>
                         </a:solidFill>
@@ -10668,6 +10705,111 @@
                 <a:extLst>
                   <a:ext uri="{0D108BD9-81ED-4DB2-BD59-A6C34878D82A}">
                     <a16:rowId xmlns:a16="http://schemas.microsoft.com/office/drawing/2014/main" val="2918213860"/>
+                  </a:ext>
+                </a:extLst>
+              </a:tr>
+              <a:tr h="762000">
+                <a:tc>
+                  <a:txBody>
+                    <a:bodyPr/>
+                    <a:lstStyle/>
+                    <a:p>
+                      <a:pPr marL="0" lvl="3" indent="-228600" algn="l" fontAlgn="auto">
+                        <a:spcBef>
+                          <a:spcPts val="0"/>
+                        </a:spcBef>
+                        <a:spcAft>
+                          <a:spcPts val="0"/>
+                        </a:spcAft>
+                        <a:buClrTx/>
+                        <a:defRPr/>
+                      </a:pPr>
+                      <a:r>
+                        <a:rPr lang="en-US" sz="1200" dirty="0" smtClean="0"/>
+                        <a:t>Integration with external systems</a:t>
+                      </a:r>
+                      <a:endParaRPr lang="en-US" sz="1200" dirty="0"/>
+                    </a:p>
+                  </a:txBody>
+                  <a:tcPr/>
+                </a:tc>
+                <a:tc>
+                  <a:txBody>
+                    <a:bodyPr/>
+                    <a:lstStyle/>
+                    <a:p>
+                      <a:r>
+                        <a:rPr lang="en-US" sz="1200" dirty="0" smtClean="0"/>
+                        <a:t>Example:</a:t>
+                      </a:r>
+                      <a:r>
+                        <a:rPr lang="en-US" sz="1200" baseline="0" dirty="0" smtClean="0"/>
+                        <a:t> Form Builder -</a:t>
+                      </a:r>
+                      <a:r>
+                        <a:rPr lang="en-US" sz="1200" dirty="0" smtClean="0"/>
+                        <a:t> breaking up modules into smaller parts and deploying separately, using additional capabilities of FB</a:t>
+                      </a:r>
+                      <a:endParaRPr lang="en-US" sz="1200" kern="1200" dirty="0">
+                        <a:solidFill>
+                          <a:schemeClr val="dk1"/>
+                        </a:solidFill>
+                        <a:latin typeface="+mn-lt"/>
+                        <a:ea typeface="+mn-ea"/>
+                        <a:cs typeface="+mn-cs"/>
+                      </a:endParaRPr>
+                    </a:p>
+                  </a:txBody>
+                  <a:tcPr/>
+                </a:tc>
+                <a:tc>
+                  <a:txBody>
+                    <a:bodyPr/>
+                    <a:lstStyle/>
+                    <a:p>
+                      <a:pPr marL="0" marR="0" indent="0" algn="l" defTabSz="457200" rtl="0" eaLnBrk="1" fontAlgn="auto" latinLnBrk="0" hangingPunct="1">
+                        <a:lnSpc>
+                          <a:spcPct val="100000"/>
+                        </a:lnSpc>
+                        <a:spcBef>
+                          <a:spcPts val="0"/>
+                        </a:spcBef>
+                        <a:spcAft>
+                          <a:spcPts val="0"/>
+                        </a:spcAft>
+                        <a:buClrTx/>
+                        <a:buSzTx/>
+                        <a:buFontTx/>
+                        <a:buNone/>
+                        <a:tabLst/>
+                        <a:defRPr/>
+                      </a:pPr>
+                      <a:r>
+                        <a:rPr lang="en-US" sz="1200" kern="1200" dirty="0" smtClean="0">
+                          <a:solidFill>
+                            <a:schemeClr val="dk1"/>
+                          </a:solidFill>
+                          <a:latin typeface="+mn-lt"/>
+                          <a:ea typeface="+mn-ea"/>
+                          <a:cs typeface="+mn-cs"/>
+                        </a:rPr>
+                        <a:t>From mid-July 2016 until end of the project</a:t>
+                      </a:r>
+                      <a:endParaRPr lang="en-US" sz="1200" kern="1200" dirty="0">
+                        <a:solidFill>
+                          <a:schemeClr val="dk1"/>
+                        </a:solidFill>
+                        <a:latin typeface="+mn-lt"/>
+                        <a:ea typeface="+mn-ea"/>
+                        <a:cs typeface="+mn-cs"/>
+                      </a:endParaRPr>
+                    </a:p>
+                  </a:txBody>
+                  <a:tcPr/>
+                </a:tc>
+                <a:extLst>
+                  <a:ext uri="{0D108BD9-81ED-4DB2-BD59-A6C34878D82A}">
+                    <a16:rowId xmlns:a16="http://schemas.microsoft.com/office/drawing/2014/main" val="2509235077"/>
                   </a:ext>
                 </a:extLst>
               </a:tr>
@@ -10695,12 +10837,12 @@
                         <a:defRPr/>
                       </a:pPr>
                       <a:r>
-                        <a:rPr lang="en-US" sz="1600" dirty="0" smtClean="0"/>
+                        <a:rPr lang="en-US" sz="1200" dirty="0" smtClean="0"/>
                         <a:t>Provide UI reporting capabilities</a:t>
                       </a:r>
                     </a:p>
                     <a:p>
-                      <a:endParaRPr lang="en-US" sz="1600" dirty="0"/>
+                      <a:endParaRPr lang="en-US" sz="1200" dirty="0"/>
                     </a:p>
                   </a:txBody>
                   <a:tcPr/>
@@ -10711,14 +10853,14 @@
                     <a:lstStyle/>
                     <a:p>
                       <a:r>
-                        <a:rPr lang="en-US" sz="1600" dirty="0" smtClean="0"/>
+                        <a:rPr lang="en-US" sz="1200" dirty="0" smtClean="0"/>
                         <a:t>This phase might be not</a:t>
                       </a:r>
                       <a:r>
-                        <a:rPr lang="en-US" sz="1600" baseline="0" dirty="0" smtClean="0"/>
+                        <a:rPr lang="en-US" sz="1200" baseline="0" dirty="0" smtClean="0"/>
                         <a:t> necessary if OGA will use other tools for reporting purposes</a:t>
                       </a:r>
-                      <a:endParaRPr lang="en-US" sz="1600" dirty="0"/>
+                      <a:endParaRPr lang="en-US" sz="1200" dirty="0"/>
                     </a:p>
                   </a:txBody>
                   <a:tcPr/>
@@ -10729,14 +10871,14 @@
                     <a:lstStyle/>
                     <a:p>
                       <a:r>
-                        <a:rPr lang="en-US" sz="1600" dirty="0" smtClean="0"/>
+                        <a:rPr lang="en-US" sz="1200" dirty="0" smtClean="0"/>
                         <a:t>Spring-summer</a:t>
                       </a:r>
                       <a:r>
-                        <a:rPr lang="en-US" sz="1600" baseline="0" dirty="0" smtClean="0"/>
+                        <a:rPr lang="en-US" sz="1200" baseline="0" dirty="0" smtClean="0"/>
                         <a:t> 2017</a:t>
                       </a:r>
-                      <a:endParaRPr lang="en-US" sz="1600" dirty="0"/>
+                      <a:endParaRPr lang="en-US" sz="1200" dirty="0"/>
                     </a:p>
                   </a:txBody>
                   <a:tcPr/>
@@ -12235,6 +12377,15 @@
 </file>
 
 <file path=customXml/item2.xml><?xml version="1.0" encoding="utf-8"?>
+<?mso-contentType ?>
+<FormTemplates xmlns="http://schemas.microsoft.com/sharepoint/v3/contenttype/forms">
+  <Display>DocumentLibraryForm</Display>
+  <Edit>DocumentLibraryForm</Edit>
+  <New>DocumentLibraryForm</New>
+</FormTemplates>
+</file>
+
+<file path=customXml/item3.xml><?xml version="1.0" encoding="utf-8"?>
 <ct:contentTypeSchema xmlns:ct="http://schemas.microsoft.com/office/2006/metadata/contentType" xmlns:ma="http://schemas.microsoft.com/office/2006/metadata/properties/metaAttributes" ct:_="" ma:_="" ma:contentTypeName="Document" ma:contentTypeID="0x010100498B138B6814904BA1F9E4F14E08F74D" ma:contentTypeVersion="0" ma:contentTypeDescription="Create a new document." ma:contentTypeScope="" ma:versionID="20dc333bebcf905b381783348d4cbf88">
   <xsd:schema xmlns:xsd="http://www.w3.org/2001/XMLSchema" xmlns:xs="http://www.w3.org/2001/XMLSchema" xmlns:p="http://schemas.microsoft.com/office/2006/metadata/properties" targetNamespace="http://schemas.microsoft.com/office/2006/metadata/properties" ma:root="true" ma:fieldsID="c64490b4aec6201516c3a874156f37b2">
     <xsd:element name="properties">
@@ -12348,31 +12499,30 @@
 </ct:contentTypeSchema>
 </file>
 
-<file path=customXml/item3.xml><?xml version="1.0" encoding="utf-8"?>
-<?mso-contentType ?>
-<FormTemplates xmlns="http://schemas.microsoft.com/sharepoint/v3/contenttype/forms">
-  <Display>DocumentLibraryForm</Display>
-  <Edit>DocumentLibraryForm</Edit>
-  <New>DocumentLibraryForm</New>
-</FormTemplates>
-</file>
-
 <file path=customXml/itemProps1.xml><?xml version="1.0" encoding="utf-8"?>
 <ds:datastoreItem xmlns:ds="http://schemas.openxmlformats.org/officeDocument/2006/customXml" ds:itemID="{4C535039-3F37-4243-9AAC-908669651B70}">
   <ds:schemaRefs>
     <ds:schemaRef ds:uri="http://purl.org/dc/elements/1.1/"/>
     <ds:schemaRef ds:uri="http://schemas.microsoft.com/office/2006/documentManagement/types"/>
+    <ds:schemaRef ds:uri="http://schemas.microsoft.com/office/infopath/2007/PartnerControls"/>
+    <ds:schemaRef ds:uri="http://schemas.microsoft.com/office/2006/metadata/properties"/>
+    <ds:schemaRef ds:uri="http://schemas.openxmlformats.org/package/2006/metadata/core-properties"/>
     <ds:schemaRef ds:uri="http://www.w3.org/XML/1998/namespace"/>
     <ds:schemaRef ds:uri="http://purl.org/dc/terms/"/>
     <ds:schemaRef ds:uri="http://purl.org/dc/dcmitype/"/>
-    <ds:schemaRef ds:uri="http://schemas.openxmlformats.org/package/2006/metadata/core-properties"/>
-    <ds:schemaRef ds:uri="http://schemas.microsoft.com/office/infopath/2007/PartnerControls"/>
-    <ds:schemaRef ds:uri="http://schemas.microsoft.com/office/2006/metadata/properties"/>
   </ds:schemaRefs>
 </ds:datastoreItem>
 </file>
 
 <file path=customXml/itemProps2.xml><?xml version="1.0" encoding="utf-8"?>
+<ds:datastoreItem xmlns:ds="http://schemas.openxmlformats.org/officeDocument/2006/customXml" ds:itemID="{28E1A144-DA3A-434B-950F-9C912E6989E1}">
+  <ds:schemaRefs>
+    <ds:schemaRef ds:uri="http://schemas.microsoft.com/sharepoint/v3/contenttype/forms"/>
+  </ds:schemaRefs>
+</ds:datastoreItem>
+</file>
+
+<file path=customXml/itemProps3.xml><?xml version="1.0" encoding="utf-8"?>
 <ds:datastoreItem xmlns:ds="http://schemas.openxmlformats.org/officeDocument/2006/customXml" ds:itemID="{8AB24EC2-3234-4ADA-86CC-3B219D00D39D}">
   <ds:schemaRefs>
     <ds:schemaRef ds:uri="http://schemas.microsoft.com/office/2006/metadata/contentType"/>
@@ -12386,12 +12536,4 @@
     <ds:schemaRef ds:uri="http://schemas.microsoft.com/office/infopath/2007/PartnerControls"/>
   </ds:schemaRefs>
 </ds:datastoreItem>
-</file>
-
-<file path=customXml/itemProps3.xml><?xml version="1.0" encoding="utf-8"?>
-<ds:datastoreItem xmlns:ds="http://schemas.openxmlformats.org/officeDocument/2006/customXml" ds:itemID="{28E1A144-DA3A-434B-950F-9C912E6989E1}">
-  <ds:schemaRefs>
-    <ds:schemaRef ds:uri="http://schemas.microsoft.com/sharepoint/v3/contenttype/forms"/>
-  </ds:schemaRefs>
-</ds:datastoreItem>
 </file>
</xml_diff>